<commit_message>
commit correction of lecture
</commit_message>
<xml_diff>
--- a/WebLecture/Lecture2-HTML.pptx
+++ b/WebLecture/Lecture2-HTML.pptx
@@ -28645,7 +28645,7 @@
         </p:nvSpPr>
         <p:spPr>
           <a:xfrm>
-            <a:off x="3258106" y="604027"/>
+            <a:off x="2931111" y="737191"/>
             <a:ext cx="5921406" cy="584775"/>
           </a:xfrm>
           <a:prstGeom prst="rect">
@@ -28669,6 +28669,50 @@
                 <a:ea typeface="Microsoft YaHei" panose="020B0503020204020204" pitchFamily="34" charset="-122"/>
               </a:rPr>
               <a:t>Design of a static website</a:t>
+            </a:r>
+          </a:p>
+        </p:txBody>
+      </p:sp>
+      <p:sp>
+        <p:nvSpPr>
+          <p:cNvPr id="4" name="TextBox 3">
+            <a:extLst>
+              <a:ext uri="{FF2B5EF4-FFF2-40B4-BE49-F238E27FC236}">
+                <a16:creationId xmlns:a16="http://schemas.microsoft.com/office/drawing/2014/main" id="{08CC9320-95A6-4372-8C74-0A17BB677838}"/>
+              </a:ext>
+            </a:extLst>
+          </p:cNvPr>
+          <p:cNvSpPr txBox="1"/>
+          <p:nvPr/>
+        </p:nvSpPr>
+        <p:spPr>
+          <a:xfrm>
+            <a:off x="2099570" y="2890391"/>
+            <a:ext cx="8238477" cy="1493358"/>
+          </a:xfrm>
+          <a:prstGeom prst="rect">
+            <a:avLst/>
+          </a:prstGeom>
+          <a:noFill/>
+        </p:spPr>
+        <p:txBody>
+          <a:bodyPr wrap="square">
+            <a:spAutoFit/>
+          </a:bodyPr>
+          <a:lstStyle/>
+          <a:p>
+            <a:pPr>
+              <a:lnSpc>
+                <a:spcPct val="150000"/>
+              </a:lnSpc>
+            </a:pPr>
+            <a:r>
+              <a:rPr lang="en-CA" sz="3200" dirty="0">
+                <a:solidFill>
+                  <a:srgbClr val="FF0000"/>
+                </a:solidFill>
+              </a:rPr>
+              <a:t>https://github.com/jianchentech/WebCamp/blob/main/WebProject/WebStatic.md</a:t>
             </a:r>
           </a:p>
         </p:txBody>

</xml_diff>